<commit_message>
Final powerpoint for 15th of May
</commit_message>
<xml_diff>
--- a/15May2014.pptx
+++ b/15May2014.pptx
@@ -9,6 +9,12 @@
     <p:sldId id="257" r:id="rId3"/>
     <p:sldId id="258" r:id="rId4"/>
     <p:sldId id="259" r:id="rId5"/>
+    <p:sldId id="260" r:id="rId6"/>
+    <p:sldId id="261" r:id="rId7"/>
+    <p:sldId id="262" r:id="rId8"/>
+    <p:sldId id="263" r:id="rId9"/>
+    <p:sldId id="264" r:id="rId10"/>
+    <p:sldId id="265" r:id="rId11"/>
   </p:sldIdLst>
   <p:sldSz cx="9144000" cy="6858000" type="screen4x3"/>
   <p:notesSz cx="6858000" cy="9144000"/>
@@ -3120,7 +3126,7 @@
         </p:blipFill>
         <p:spPr>
           <a:xfrm>
-            <a:off x="1979712" y="1772816"/>
+            <a:off x="1691680" y="1844824"/>
             <a:ext cx="7596336" cy="4965086"/>
           </a:xfrm>
           <a:prstGeom prst="rect">
@@ -3438,6 +3444,149 @@
   <p:clrMapOvr>
     <a:masterClrMapping/>
   </p:clrMapOvr>
+  <p:timing>
+    <p:tnLst>
+      <p:par>
+        <p:cTn id="1" dur="indefinite" restart="never" nodeType="tmRoot"/>
+      </p:par>
+    </p:tnLst>
+  </p:timing>
+</p:sld>
+</file>
+
+<file path=ppt/slides/slide10.xml><?xml version="1.0" encoding="utf-8"?>
+<p:sld xmlns:a="http://schemas.openxmlformats.org/drawingml/2006/main" xmlns:r="http://schemas.openxmlformats.org/officeDocument/2006/relationships" xmlns:p="http://schemas.openxmlformats.org/presentationml/2006/main">
+  <p:cSld>
+    <p:spTree>
+      <p:nvGrpSpPr>
+        <p:cNvPr id="1" name=""/>
+        <p:cNvGrpSpPr/>
+        <p:nvPr/>
+      </p:nvGrpSpPr>
+      <p:grpSpPr>
+        <a:xfrm>
+          <a:off x="0" y="0"/>
+          <a:ext cx="0" cy="0"/>
+          <a:chOff x="0" y="0"/>
+          <a:chExt cx="0" cy="0"/>
+        </a:xfrm>
+      </p:grpSpPr>
+      <p:sp>
+        <p:nvSpPr>
+          <p:cNvPr id="2" name="Title 1"/>
+          <p:cNvSpPr>
+            <a:spLocks noGrp="1"/>
+          </p:cNvSpPr>
+          <p:nvPr>
+            <p:ph type="title"/>
+          </p:nvPr>
+        </p:nvSpPr>
+        <p:spPr/>
+        <p:txBody>
+          <a:bodyPr/>
+          <a:lstStyle/>
+          <a:p>
+            <a:r>
+              <a:rPr lang="en-NZ" dirty="0" smtClean="0"/>
+              <a:t>St. Francis Studies</a:t>
+            </a:r>
+            <a:endParaRPr lang="en-NZ" dirty="0"/>
+          </a:p>
+        </p:txBody>
+      </p:sp>
+      <p:sp>
+        <p:nvSpPr>
+          <p:cNvPr id="3" name="Content Placeholder 2"/>
+          <p:cNvSpPr>
+            <a:spLocks noGrp="1"/>
+          </p:cNvSpPr>
+          <p:nvPr>
+            <p:ph idx="1"/>
+          </p:nvPr>
+        </p:nvSpPr>
+        <p:spPr/>
+        <p:txBody>
+          <a:bodyPr>
+            <a:normAutofit lnSpcReduction="10000"/>
+          </a:bodyPr>
+          <a:lstStyle/>
+          <a:p>
+            <a:r>
+              <a:rPr lang="en-NZ" dirty="0" smtClean="0"/>
+              <a:t>4 New studies from St. Francis have come in. </a:t>
+            </a:r>
+          </a:p>
+          <a:p>
+            <a:r>
+              <a:rPr lang="en-NZ" dirty="0" smtClean="0"/>
+              <a:t>Jane says: </a:t>
+            </a:r>
+            <a:endParaRPr lang="en-NZ" dirty="0"/>
+          </a:p>
+          <a:p>
+            <a:r>
+              <a:rPr lang="en-US" dirty="0" smtClean="0"/>
+              <a:t>‘Of </a:t>
+            </a:r>
+            <a:r>
+              <a:rPr lang="en-US" dirty="0"/>
+              <a:t>note all </a:t>
+            </a:r>
+            <a:r>
+              <a:rPr lang="en-US" dirty="0" smtClean="0"/>
+              <a:t>these are </a:t>
+            </a:r>
+            <a:r>
+              <a:rPr lang="en-US" dirty="0"/>
+              <a:t>clinical cases. Few are normal in a strict sense. I selected them because they do not have cardiovascular history, </a:t>
+            </a:r>
+            <a:r>
+              <a:rPr lang="en-US" dirty="0" smtClean="0"/>
+              <a:t>no gross abnormalities </a:t>
+            </a:r>
+            <a:r>
+              <a:rPr lang="en-US" dirty="0"/>
+              <a:t>on cardiac MRI or on cath</a:t>
+            </a:r>
+            <a:r>
+              <a:rPr lang="en-US" dirty="0" smtClean="0"/>
+              <a:t>. And </a:t>
+            </a:r>
+            <a:r>
+              <a:rPr lang="en-US" dirty="0"/>
+              <a:t>they have decent tracings</a:t>
+            </a:r>
+            <a:r>
+              <a:rPr lang="en-US" dirty="0" smtClean="0"/>
+              <a:t>.’</a:t>
+            </a:r>
+          </a:p>
+          <a:p>
+            <a:r>
+              <a:rPr lang="en-US" dirty="0" smtClean="0"/>
+              <a:t>Currently processing CIM models. </a:t>
+            </a:r>
+            <a:endParaRPr lang="en-NZ" dirty="0"/>
+          </a:p>
+        </p:txBody>
+      </p:sp>
+    </p:spTree>
+    <p:extLst>
+      <p:ext uri="{BB962C8B-B14F-4D97-AF65-F5344CB8AC3E}">
+        <p14:creationId xmlns:p14="http://schemas.microsoft.com/office/powerpoint/2010/main" val="3832988184"/>
+      </p:ext>
+    </p:extLst>
+  </p:cSld>
+  <p:clrMapOvr>
+    <a:masterClrMapping/>
+  </p:clrMapOvr>
+  <p:timing>
+    <p:tnLst>
+      <p:par>
+        <p:cTn id="1" dur="indefinite" restart="never" nodeType="tmRoot"/>
+      </p:par>
+    </p:tnLst>
+  </p:timing>
 </p:sld>
 </file>
 
@@ -3518,7 +3667,7 @@
         </p:blipFill>
         <p:spPr>
           <a:xfrm>
-            <a:off x="611560" y="1385368"/>
+            <a:off x="611560" y="1244644"/>
             <a:ext cx="3600400" cy="2695487"/>
           </a:xfrm>
           <a:prstGeom prst="rect">
@@ -4527,6 +4676,1862 @@
     <p:extLst>
       <p:ext uri="{BB962C8B-B14F-4D97-AF65-F5344CB8AC3E}">
         <p14:creationId xmlns:p14="http://schemas.microsoft.com/office/powerpoint/2010/main" val="2838117388"/>
+      </p:ext>
+    </p:extLst>
+  </p:cSld>
+  <p:clrMapOvr>
+    <a:masterClrMapping/>
+  </p:clrMapOvr>
+  <p:timing>
+    <p:tnLst>
+      <p:par>
+        <p:cTn id="1" dur="indefinite" restart="never" nodeType="tmRoot"/>
+      </p:par>
+    </p:tnLst>
+  </p:timing>
+</p:sld>
+</file>
+
+<file path=ppt/slides/slide5.xml><?xml version="1.0" encoding="utf-8"?>
+<p:sld xmlns:a="http://schemas.openxmlformats.org/drawingml/2006/main" xmlns:r="http://schemas.openxmlformats.org/officeDocument/2006/relationships" xmlns:p="http://schemas.openxmlformats.org/presentationml/2006/main">
+  <p:cSld>
+    <p:spTree>
+      <p:nvGrpSpPr>
+        <p:cNvPr id="1" name=""/>
+        <p:cNvGrpSpPr/>
+        <p:nvPr/>
+      </p:nvGrpSpPr>
+      <p:grpSpPr>
+        <a:xfrm>
+          <a:off x="0" y="0"/>
+          <a:ext cx="0" cy="0"/>
+          <a:chOff x="0" y="0"/>
+          <a:chExt cx="0" cy="0"/>
+        </a:xfrm>
+      </p:grpSpPr>
+      <p:sp>
+        <p:nvSpPr>
+          <p:cNvPr id="2" name="Title 1"/>
+          <p:cNvSpPr>
+            <a:spLocks noGrp="1"/>
+          </p:cNvSpPr>
+          <p:nvPr>
+            <p:ph type="title"/>
+          </p:nvPr>
+        </p:nvSpPr>
+        <p:spPr>
+          <a:xfrm>
+            <a:off x="441194" y="231666"/>
+            <a:ext cx="8229600" cy="778098"/>
+          </a:xfrm>
+        </p:spPr>
+        <p:txBody>
+          <a:bodyPr/>
+          <a:lstStyle/>
+          <a:p>
+            <a:r>
+              <a:rPr lang="en-NZ" dirty="0" smtClean="0"/>
+              <a:t>MICCAI Challenge</a:t>
+            </a:r>
+            <a:endParaRPr lang="en-NZ" dirty="0"/>
+          </a:p>
+        </p:txBody>
+      </p:sp>
+      <p:pic>
+        <p:nvPicPr>
+          <p:cNvPr id="1030" name="Picture 6" descr="RegularSurfacePonts.jpg"/>
+          <p:cNvPicPr>
+            <a:picLocks noChangeAspect="1" noChangeArrowheads="1"/>
+          </p:cNvPicPr>
+          <p:nvPr/>
+        </p:nvPicPr>
+        <p:blipFill>
+          <a:blip r:embed="rId2" cstate="print">
+            <a:extLst>
+              <a:ext uri="{28A0092B-C50C-407E-A947-70E740481C1C}">
+                <a14:useLocalDpi xmlns:a14="http://schemas.microsoft.com/office/drawing/2010/main" val="0"/>
+              </a:ext>
+            </a:extLst>
+          </a:blip>
+          <a:srcRect/>
+          <a:stretch>
+            <a:fillRect/>
+          </a:stretch>
+        </p:blipFill>
+        <p:spPr bwMode="auto">
+          <a:xfrm>
+            <a:off x="2915816" y="1368582"/>
+            <a:ext cx="3816424" cy="2520134"/>
+          </a:xfrm>
+          <a:prstGeom prst="rect">
+            <a:avLst/>
+          </a:prstGeom>
+          <a:noFill/>
+          <a:extLst>
+            <a:ext uri="{909E8E84-426E-40DD-AFC4-6F175D3DCCD1}">
+              <a14:hiddenFill xmlns:a14="http://schemas.microsoft.com/office/drawing/2010/main">
+                <a:solidFill>
+                  <a:srgbClr val="FFFFFF"/>
+                </a:solidFill>
+              </a14:hiddenFill>
+            </a:ext>
+          </a:extLst>
+        </p:spPr>
+      </p:pic>
+      <p:sp>
+        <p:nvSpPr>
+          <p:cNvPr id="4" name="TextBox 3"/>
+          <p:cNvSpPr txBox="1"/>
+          <p:nvPr/>
+        </p:nvSpPr>
+        <p:spPr>
+          <a:xfrm>
+            <a:off x="2987824" y="1009764"/>
+            <a:ext cx="3168352" cy="307777"/>
+          </a:xfrm>
+          <a:prstGeom prst="rect">
+            <a:avLst/>
+          </a:prstGeom>
+          <a:noFill/>
+        </p:spPr>
+        <p:txBody>
+          <a:bodyPr wrap="square" rtlCol="0">
+            <a:spAutoFit/>
+          </a:bodyPr>
+          <a:lstStyle/>
+          <a:p>
+            <a:pPr algn="ctr"/>
+            <a:r>
+              <a:rPr lang="en-NZ" sz="1400" dirty="0" smtClean="0"/>
+              <a:t>Geometric Fitting</a:t>
+            </a:r>
+            <a:endParaRPr lang="en-NZ" sz="1400" dirty="0"/>
+          </a:p>
+        </p:txBody>
+      </p:sp>
+      <p:pic>
+        <p:nvPicPr>
+          <p:cNvPr id="1028" name="Picture 4" descr="Translation.jpg"/>
+          <p:cNvPicPr>
+            <a:picLocks noChangeAspect="1" noChangeArrowheads="1"/>
+          </p:cNvPicPr>
+          <p:nvPr/>
+        </p:nvPicPr>
+        <p:blipFill>
+          <a:blip r:embed="rId3" cstate="print">
+            <a:extLst>
+              <a:ext uri="{28A0092B-C50C-407E-A947-70E740481C1C}">
+                <a14:useLocalDpi xmlns:a14="http://schemas.microsoft.com/office/drawing/2010/main" val="0"/>
+              </a:ext>
+            </a:extLst>
+          </a:blip>
+          <a:srcRect/>
+          <a:stretch>
+            <a:fillRect/>
+          </a:stretch>
+        </p:blipFill>
+        <p:spPr bwMode="auto">
+          <a:xfrm>
+            <a:off x="5519717" y="1331584"/>
+            <a:ext cx="3528392" cy="2329935"/>
+          </a:xfrm>
+          <a:prstGeom prst="rect">
+            <a:avLst/>
+          </a:prstGeom>
+          <a:noFill/>
+          <a:extLst>
+            <a:ext uri="{909E8E84-426E-40DD-AFC4-6F175D3DCCD1}">
+              <a14:hiddenFill xmlns:a14="http://schemas.microsoft.com/office/drawing/2010/main">
+                <a:solidFill>
+                  <a:srgbClr val="FFFFFF"/>
+                </a:solidFill>
+              </a14:hiddenFill>
+            </a:ext>
+          </a:extLst>
+        </p:spPr>
+      </p:pic>
+      <p:pic>
+        <p:nvPicPr>
+          <p:cNvPr id="1026" name="Picture 2" descr="prolate_spheroid.jpg"/>
+          <p:cNvPicPr>
+            <a:picLocks noChangeAspect="1" noChangeArrowheads="1"/>
+          </p:cNvPicPr>
+          <p:nvPr/>
+        </p:nvPicPr>
+        <p:blipFill>
+          <a:blip r:embed="rId4">
+            <a:extLst>
+              <a:ext uri="{28A0092B-C50C-407E-A947-70E740481C1C}">
+                <a14:useLocalDpi xmlns:a14="http://schemas.microsoft.com/office/drawing/2010/main" val="0"/>
+              </a:ext>
+            </a:extLst>
+          </a:blip>
+          <a:srcRect/>
+          <a:stretch>
+            <a:fillRect/>
+          </a:stretch>
+        </p:blipFill>
+        <p:spPr bwMode="auto">
+          <a:xfrm>
+            <a:off x="549424" y="1317541"/>
+            <a:ext cx="2543506" cy="2515805"/>
+          </a:xfrm>
+          <a:prstGeom prst="rect">
+            <a:avLst/>
+          </a:prstGeom>
+          <a:noFill/>
+          <a:extLst>
+            <a:ext uri="{909E8E84-426E-40DD-AFC4-6F175D3DCCD1}">
+              <a14:hiddenFill xmlns:a14="http://schemas.microsoft.com/office/drawing/2010/main">
+                <a:solidFill>
+                  <a:srgbClr val="FFFFFF"/>
+                </a:solidFill>
+              </a14:hiddenFill>
+            </a:ext>
+          </a:extLst>
+        </p:spPr>
+      </p:pic>
+      <p:sp>
+        <p:nvSpPr>
+          <p:cNvPr id="5" name="TextBox 4"/>
+          <p:cNvSpPr txBox="1"/>
+          <p:nvPr/>
+        </p:nvSpPr>
+        <p:spPr>
+          <a:xfrm>
+            <a:off x="323528" y="3861048"/>
+            <a:ext cx="2880320" cy="461665"/>
+          </a:xfrm>
+          <a:prstGeom prst="rect">
+            <a:avLst/>
+          </a:prstGeom>
+          <a:noFill/>
+        </p:spPr>
+        <p:txBody>
+          <a:bodyPr wrap="square" rtlCol="0">
+            <a:spAutoFit/>
+          </a:bodyPr>
+          <a:lstStyle/>
+          <a:p>
+            <a:pPr algn="ctr"/>
+            <a:r>
+              <a:rPr lang="en-NZ" sz="1200" dirty="0" smtClean="0"/>
+              <a:t>Prolate spheroid regular model in rectangular Cartesian coordinate system.</a:t>
+            </a:r>
+            <a:endParaRPr lang="en-NZ" sz="1200" dirty="0"/>
+          </a:p>
+        </p:txBody>
+      </p:sp>
+      <p:pic>
+        <p:nvPicPr>
+          <p:cNvPr id="1032" name="Picture 8" descr="https://lh4.googleusercontent.com/6STqeK8hSzSDDW4QPw2ju8uO5F7fUrcvXBq6vvKPiGCLr_KUB7YByPOzM2AL2jFXH3xIV0inIuikT888QmDdLGpyxX7HKgT4vfj31WhV1g-zqOAaPrNcs9s-ahUwL382Tg"/>
+          <p:cNvPicPr>
+            <a:picLocks noChangeAspect="1" noChangeArrowheads="1"/>
+          </p:cNvPicPr>
+          <p:nvPr/>
+        </p:nvPicPr>
+        <p:blipFill>
+          <a:blip r:embed="rId5" cstate="print">
+            <a:extLst>
+              <a:ext uri="{28A0092B-C50C-407E-A947-70E740481C1C}">
+                <a14:useLocalDpi xmlns:a14="http://schemas.microsoft.com/office/drawing/2010/main" val="0"/>
+              </a:ext>
+            </a:extLst>
+          </a:blip>
+          <a:srcRect/>
+          <a:stretch>
+            <a:fillRect/>
+          </a:stretch>
+        </p:blipFill>
+        <p:spPr bwMode="auto">
+          <a:xfrm>
+            <a:off x="5584835" y="4095010"/>
+            <a:ext cx="3398155" cy="2243934"/>
+          </a:xfrm>
+          <a:prstGeom prst="rect">
+            <a:avLst/>
+          </a:prstGeom>
+          <a:noFill/>
+          <a:extLst>
+            <a:ext uri="{909E8E84-426E-40DD-AFC4-6F175D3DCCD1}">
+              <a14:hiddenFill xmlns:a14="http://schemas.microsoft.com/office/drawing/2010/main">
+                <a:solidFill>
+                  <a:srgbClr val="FFFFFF"/>
+                </a:solidFill>
+              </a14:hiddenFill>
+            </a:ext>
+          </a:extLst>
+        </p:spPr>
+      </p:pic>
+      <p:sp>
+        <p:nvSpPr>
+          <p:cNvPr id="8" name="TextBox 7"/>
+          <p:cNvSpPr txBox="1"/>
+          <p:nvPr/>
+        </p:nvSpPr>
+        <p:spPr>
+          <a:xfrm>
+            <a:off x="6012963" y="3752344"/>
+            <a:ext cx="2543506" cy="276999"/>
+          </a:xfrm>
+          <a:prstGeom prst="rect">
+            <a:avLst/>
+          </a:prstGeom>
+          <a:noFill/>
+        </p:spPr>
+        <p:txBody>
+          <a:bodyPr wrap="square" rtlCol="0">
+            <a:spAutoFit/>
+          </a:bodyPr>
+          <a:lstStyle/>
+          <a:p>
+            <a:pPr algn="ctr"/>
+            <a:r>
+              <a:rPr lang="en-NZ" sz="1200" dirty="0" smtClean="0"/>
+              <a:t>Register to challenge surface data</a:t>
+            </a:r>
+            <a:endParaRPr lang="en-NZ" sz="1200" dirty="0"/>
+          </a:p>
+        </p:txBody>
+      </p:sp>
+      <p:sp>
+        <p:nvSpPr>
+          <p:cNvPr id="10" name="TextBox 9"/>
+          <p:cNvSpPr txBox="1"/>
+          <p:nvPr/>
+        </p:nvSpPr>
+        <p:spPr>
+          <a:xfrm>
+            <a:off x="3203848" y="3861048"/>
+            <a:ext cx="2855929" cy="276999"/>
+          </a:xfrm>
+          <a:prstGeom prst="rect">
+            <a:avLst/>
+          </a:prstGeom>
+          <a:noFill/>
+        </p:spPr>
+        <p:txBody>
+          <a:bodyPr wrap="square" rtlCol="0">
+            <a:spAutoFit/>
+          </a:bodyPr>
+          <a:lstStyle/>
+          <a:p>
+            <a:pPr algn="ctr"/>
+            <a:r>
+              <a:rPr lang="en-NZ" sz="1200" dirty="0" smtClean="0"/>
+              <a:t>Generate regular model surface points</a:t>
+            </a:r>
+            <a:endParaRPr lang="en-NZ" sz="1200" dirty="0"/>
+          </a:p>
+        </p:txBody>
+      </p:sp>
+      <p:sp>
+        <p:nvSpPr>
+          <p:cNvPr id="12" name="TextBox 11"/>
+          <p:cNvSpPr txBox="1"/>
+          <p:nvPr/>
+        </p:nvSpPr>
+        <p:spPr>
+          <a:xfrm>
+            <a:off x="5868144" y="6393752"/>
+            <a:ext cx="2831538" cy="276999"/>
+          </a:xfrm>
+          <a:prstGeom prst="rect">
+            <a:avLst/>
+          </a:prstGeom>
+          <a:noFill/>
+        </p:spPr>
+        <p:txBody>
+          <a:bodyPr wrap="square" rtlCol="0">
+            <a:spAutoFit/>
+          </a:bodyPr>
+          <a:lstStyle/>
+          <a:p>
+            <a:pPr algn="ctr"/>
+            <a:r>
+              <a:rPr lang="en-NZ" sz="1200" dirty="0" smtClean="0"/>
+              <a:t>Scale to match general dimensions of data</a:t>
+            </a:r>
+            <a:endParaRPr lang="en-NZ" sz="1200" dirty="0"/>
+          </a:p>
+        </p:txBody>
+      </p:sp>
+      <p:cxnSp>
+        <p:nvCxnSpPr>
+          <p:cNvPr id="7" name="Straight Arrow Connector 6"/>
+          <p:cNvCxnSpPr/>
+          <p:nvPr/>
+        </p:nvCxnSpPr>
+        <p:spPr>
+          <a:xfrm>
+            <a:off x="3275856" y="2496551"/>
+            <a:ext cx="360040" cy="0"/>
+          </a:xfrm>
+          <a:prstGeom prst="straightConnector1">
+            <a:avLst/>
+          </a:prstGeom>
+          <a:ln>
+            <a:tailEnd type="arrow"/>
+          </a:ln>
+        </p:spPr>
+        <p:style>
+          <a:lnRef idx="1">
+            <a:schemeClr val="accent1"/>
+          </a:lnRef>
+          <a:fillRef idx="0">
+            <a:schemeClr val="accent1"/>
+          </a:fillRef>
+          <a:effectRef idx="0">
+            <a:schemeClr val="accent1"/>
+          </a:effectRef>
+          <a:fontRef idx="minor">
+            <a:schemeClr val="tx1"/>
+          </a:fontRef>
+        </p:style>
+      </p:cxnSp>
+      <p:cxnSp>
+        <p:nvCxnSpPr>
+          <p:cNvPr id="15" name="Straight Arrow Connector 14"/>
+          <p:cNvCxnSpPr/>
+          <p:nvPr/>
+        </p:nvCxnSpPr>
+        <p:spPr>
+          <a:xfrm>
+            <a:off x="5796136" y="2496551"/>
+            <a:ext cx="360040" cy="0"/>
+          </a:xfrm>
+          <a:prstGeom prst="straightConnector1">
+            <a:avLst/>
+          </a:prstGeom>
+          <a:ln>
+            <a:tailEnd type="arrow"/>
+          </a:ln>
+        </p:spPr>
+        <p:style>
+          <a:lnRef idx="1">
+            <a:schemeClr val="accent1"/>
+          </a:lnRef>
+          <a:fillRef idx="0">
+            <a:schemeClr val="accent1"/>
+          </a:fillRef>
+          <a:effectRef idx="0">
+            <a:schemeClr val="accent1"/>
+          </a:effectRef>
+          <a:fontRef idx="minor">
+            <a:schemeClr val="tx1"/>
+          </a:fontRef>
+        </p:style>
+      </p:cxnSp>
+      <p:cxnSp>
+        <p:nvCxnSpPr>
+          <p:cNvPr id="16" name="Straight Arrow Connector 15"/>
+          <p:cNvCxnSpPr/>
+          <p:nvPr/>
+        </p:nvCxnSpPr>
+        <p:spPr>
+          <a:xfrm flipH="1">
+            <a:off x="7284523" y="4023718"/>
+            <a:ext cx="1" cy="183222"/>
+          </a:xfrm>
+          <a:prstGeom prst="straightConnector1">
+            <a:avLst/>
+          </a:prstGeom>
+          <a:ln>
+            <a:tailEnd type="arrow"/>
+          </a:ln>
+        </p:spPr>
+        <p:style>
+          <a:lnRef idx="1">
+            <a:schemeClr val="accent1"/>
+          </a:lnRef>
+          <a:fillRef idx="0">
+            <a:schemeClr val="accent1"/>
+          </a:fillRef>
+          <a:effectRef idx="0">
+            <a:schemeClr val="accent1"/>
+          </a:effectRef>
+          <a:fontRef idx="minor">
+            <a:schemeClr val="tx1"/>
+          </a:fontRef>
+        </p:style>
+      </p:cxnSp>
+    </p:spTree>
+    <p:extLst>
+      <p:ext uri="{BB962C8B-B14F-4D97-AF65-F5344CB8AC3E}">
+        <p14:creationId xmlns:p14="http://schemas.microsoft.com/office/powerpoint/2010/main" val="2445790637"/>
+      </p:ext>
+    </p:extLst>
+  </p:cSld>
+  <p:clrMapOvr>
+    <a:masterClrMapping/>
+  </p:clrMapOvr>
+  <p:timing>
+    <p:tnLst>
+      <p:par>
+        <p:cTn id="1" dur="indefinite" restart="never" nodeType="tmRoot"/>
+      </p:par>
+    </p:tnLst>
+  </p:timing>
+</p:sld>
+</file>
+
+<file path=ppt/slides/slide6.xml><?xml version="1.0" encoding="utf-8"?>
+<p:sld xmlns:a="http://schemas.openxmlformats.org/drawingml/2006/main" xmlns:r="http://schemas.openxmlformats.org/officeDocument/2006/relationships" xmlns:p="http://schemas.openxmlformats.org/presentationml/2006/main">
+  <p:cSld>
+    <p:spTree>
+      <p:nvGrpSpPr>
+        <p:cNvPr id="1" name=""/>
+        <p:cNvGrpSpPr/>
+        <p:nvPr/>
+      </p:nvGrpSpPr>
+      <p:grpSpPr>
+        <a:xfrm>
+          <a:off x="0" y="0"/>
+          <a:ext cx="0" cy="0"/>
+          <a:chOff x="0" y="0"/>
+          <a:chExt cx="0" cy="0"/>
+        </a:xfrm>
+      </p:grpSpPr>
+      <p:pic>
+        <p:nvPicPr>
+          <p:cNvPr id="6" name="Picture 8" descr="https://lh4.googleusercontent.com/6STqeK8hSzSDDW4QPw2ju8uO5F7fUrcvXBq6vvKPiGCLr_KUB7YByPOzM2AL2jFXH3xIV0inIuikT888QmDdLGpyxX7HKgT4vfj31WhV1g-zqOAaPrNcs9s-ahUwL382Tg"/>
+          <p:cNvPicPr>
+            <a:picLocks noChangeAspect="1" noChangeArrowheads="1"/>
+          </p:cNvPicPr>
+          <p:nvPr/>
+        </p:nvPicPr>
+        <p:blipFill>
+          <a:blip r:embed="rId2" cstate="print">
+            <a:extLst>
+              <a:ext uri="{28A0092B-C50C-407E-A947-70E740481C1C}">
+                <a14:useLocalDpi xmlns:a14="http://schemas.microsoft.com/office/drawing/2010/main" val="0"/>
+              </a:ext>
+            </a:extLst>
+          </a:blip>
+          <a:srcRect/>
+          <a:stretch>
+            <a:fillRect/>
+          </a:stretch>
+        </p:blipFill>
+        <p:spPr bwMode="auto">
+          <a:xfrm>
+            <a:off x="8062" y="1234471"/>
+            <a:ext cx="3398155" cy="2243934"/>
+          </a:xfrm>
+          <a:prstGeom prst="rect">
+            <a:avLst/>
+          </a:prstGeom>
+          <a:noFill/>
+          <a:extLst>
+            <a:ext uri="{909E8E84-426E-40DD-AFC4-6F175D3DCCD1}">
+              <a14:hiddenFill xmlns:a14="http://schemas.microsoft.com/office/drawing/2010/main">
+                <a:solidFill>
+                  <a:srgbClr val="FFFFFF"/>
+                </a:solidFill>
+              </a14:hiddenFill>
+            </a:ext>
+          </a:extLst>
+        </p:spPr>
+      </p:pic>
+      <p:pic>
+        <p:nvPicPr>
+          <p:cNvPr id="2050" name="Picture 2" descr="EndoFit.jpg"/>
+          <p:cNvPicPr>
+            <a:picLocks noChangeAspect="1" noChangeArrowheads="1"/>
+          </p:cNvPicPr>
+          <p:nvPr/>
+        </p:nvPicPr>
+        <p:blipFill rotWithShape="1">
+          <a:blip r:embed="rId3" cstate="print">
+            <a:extLst>
+              <a:ext uri="{28A0092B-C50C-407E-A947-70E740481C1C}">
+                <a14:useLocalDpi xmlns:a14="http://schemas.microsoft.com/office/drawing/2010/main" val="0"/>
+              </a:ext>
+            </a:extLst>
+          </a:blip>
+          <a:srcRect l="13124" r="25421"/>
+          <a:stretch/>
+        </p:blipFill>
+        <p:spPr bwMode="auto">
+          <a:xfrm>
+            <a:off x="2987824" y="1143377"/>
+            <a:ext cx="2360353" cy="2536186"/>
+          </a:xfrm>
+          <a:prstGeom prst="rect">
+            <a:avLst/>
+          </a:prstGeom>
+          <a:noFill/>
+          <a:extLst>
+            <a:ext uri="{909E8E84-426E-40DD-AFC4-6F175D3DCCD1}">
+              <a14:hiddenFill xmlns:a14="http://schemas.microsoft.com/office/drawing/2010/main">
+                <a:solidFill>
+                  <a:srgbClr val="FFFFFF"/>
+                </a:solidFill>
+              </a14:hiddenFill>
+            </a:ext>
+          </a:extLst>
+        </p:spPr>
+      </p:pic>
+      <p:sp>
+        <p:nvSpPr>
+          <p:cNvPr id="4" name="Title 1"/>
+          <p:cNvSpPr>
+            <a:spLocks noGrp="1"/>
+          </p:cNvSpPr>
+          <p:nvPr>
+            <p:ph type="title"/>
+          </p:nvPr>
+        </p:nvSpPr>
+        <p:spPr>
+          <a:xfrm>
+            <a:off x="441194" y="231666"/>
+            <a:ext cx="8229600" cy="778098"/>
+          </a:xfrm>
+        </p:spPr>
+        <p:txBody>
+          <a:bodyPr/>
+          <a:lstStyle/>
+          <a:p>
+            <a:r>
+              <a:rPr lang="en-NZ" dirty="0" smtClean="0"/>
+              <a:t>MICCAI Challenge</a:t>
+            </a:r>
+            <a:endParaRPr lang="en-NZ" dirty="0"/>
+          </a:p>
+        </p:txBody>
+      </p:sp>
+      <p:pic>
+        <p:nvPicPr>
+          <p:cNvPr id="2054" name="Picture 6" descr="FinalFitError.jpg"/>
+          <p:cNvPicPr>
+            <a:picLocks noChangeAspect="1" noChangeArrowheads="1"/>
+          </p:cNvPicPr>
+          <p:nvPr/>
+        </p:nvPicPr>
+        <p:blipFill>
+          <a:blip r:embed="rId4" cstate="print">
+            <a:extLst>
+              <a:ext uri="{28A0092B-C50C-407E-A947-70E740481C1C}">
+                <a14:useLocalDpi xmlns:a14="http://schemas.microsoft.com/office/drawing/2010/main" val="0"/>
+              </a:ext>
+            </a:extLst>
+          </a:blip>
+          <a:srcRect/>
+          <a:stretch>
+            <a:fillRect/>
+          </a:stretch>
+        </p:blipFill>
+        <p:spPr bwMode="auto">
+          <a:xfrm>
+            <a:off x="2190263" y="3478403"/>
+            <a:ext cx="4808117" cy="3174988"/>
+          </a:xfrm>
+          <a:prstGeom prst="rect">
+            <a:avLst/>
+          </a:prstGeom>
+          <a:noFill/>
+          <a:extLst>
+            <a:ext uri="{909E8E84-426E-40DD-AFC4-6F175D3DCCD1}">
+              <a14:hiddenFill xmlns:a14="http://schemas.microsoft.com/office/drawing/2010/main">
+                <a:solidFill>
+                  <a:srgbClr val="FFFFFF"/>
+                </a:solidFill>
+              </a14:hiddenFill>
+            </a:ext>
+          </a:extLst>
+        </p:spPr>
+      </p:pic>
+      <p:sp>
+        <p:nvSpPr>
+          <p:cNvPr id="5" name="TextBox 4"/>
+          <p:cNvSpPr txBox="1"/>
+          <p:nvPr/>
+        </p:nvSpPr>
+        <p:spPr>
+          <a:xfrm>
+            <a:off x="2987824" y="1009764"/>
+            <a:ext cx="3168352" cy="307777"/>
+          </a:xfrm>
+          <a:prstGeom prst="rect">
+            <a:avLst/>
+          </a:prstGeom>
+          <a:noFill/>
+        </p:spPr>
+        <p:txBody>
+          <a:bodyPr wrap="square" rtlCol="0">
+            <a:spAutoFit/>
+          </a:bodyPr>
+          <a:lstStyle/>
+          <a:p>
+            <a:pPr algn="ctr"/>
+            <a:r>
+              <a:rPr lang="en-NZ" sz="1400" dirty="0" smtClean="0"/>
+              <a:t>Geometric Fitting</a:t>
+            </a:r>
+            <a:endParaRPr lang="en-NZ" sz="1400" dirty="0"/>
+          </a:p>
+        </p:txBody>
+      </p:sp>
+      <p:sp>
+        <p:nvSpPr>
+          <p:cNvPr id="7" name="TextBox 6"/>
+          <p:cNvSpPr txBox="1"/>
+          <p:nvPr/>
+        </p:nvSpPr>
+        <p:spPr>
+          <a:xfrm>
+            <a:off x="395536" y="3478405"/>
+            <a:ext cx="2831538" cy="276999"/>
+          </a:xfrm>
+          <a:prstGeom prst="rect">
+            <a:avLst/>
+          </a:prstGeom>
+          <a:noFill/>
+        </p:spPr>
+        <p:txBody>
+          <a:bodyPr wrap="square" rtlCol="0">
+            <a:spAutoFit/>
+          </a:bodyPr>
+          <a:lstStyle/>
+          <a:p>
+            <a:pPr algn="ctr"/>
+            <a:r>
+              <a:rPr lang="en-NZ" sz="1200" dirty="0" smtClean="0"/>
+              <a:t>Registered and scaled regular model </a:t>
+            </a:r>
+            <a:endParaRPr lang="en-NZ" sz="1200" dirty="0"/>
+          </a:p>
+        </p:txBody>
+      </p:sp>
+      <p:sp>
+        <p:nvSpPr>
+          <p:cNvPr id="9" name="TextBox 8"/>
+          <p:cNvSpPr txBox="1"/>
+          <p:nvPr/>
+        </p:nvSpPr>
+        <p:spPr>
+          <a:xfrm>
+            <a:off x="2987824" y="3479962"/>
+            <a:ext cx="2831538" cy="276999"/>
+          </a:xfrm>
+          <a:prstGeom prst="rect">
+            <a:avLst/>
+          </a:prstGeom>
+          <a:noFill/>
+        </p:spPr>
+        <p:txBody>
+          <a:bodyPr wrap="square" rtlCol="0">
+            <a:spAutoFit/>
+          </a:bodyPr>
+          <a:lstStyle/>
+          <a:p>
+            <a:pPr algn="ctr"/>
+            <a:r>
+              <a:rPr lang="en-NZ" sz="1200" dirty="0" smtClean="0"/>
+              <a:t>Fit to endocardial data</a:t>
+            </a:r>
+            <a:endParaRPr lang="en-NZ" sz="1200" dirty="0"/>
+          </a:p>
+        </p:txBody>
+      </p:sp>
+      <p:pic>
+        <p:nvPicPr>
+          <p:cNvPr id="2052" name="Picture 4" descr="EpiFit.jpg"/>
+          <p:cNvPicPr>
+            <a:picLocks noChangeAspect="1" noChangeArrowheads="1"/>
+          </p:cNvPicPr>
+          <p:nvPr/>
+        </p:nvPicPr>
+        <p:blipFill rotWithShape="1">
+          <a:blip r:embed="rId5" cstate="print">
+            <a:extLst>
+              <a:ext uri="{28A0092B-C50C-407E-A947-70E740481C1C}">
+                <a14:useLocalDpi xmlns:a14="http://schemas.microsoft.com/office/drawing/2010/main" val="0"/>
+              </a:ext>
+            </a:extLst>
+          </a:blip>
+          <a:srcRect l="13608" t="4871" r="21866" b="7546"/>
+          <a:stretch/>
+        </p:blipFill>
+        <p:spPr bwMode="auto">
+          <a:xfrm>
+            <a:off x="5602694" y="1249736"/>
+            <a:ext cx="2486521" cy="2228670"/>
+          </a:xfrm>
+          <a:prstGeom prst="rect">
+            <a:avLst/>
+          </a:prstGeom>
+          <a:noFill/>
+          <a:extLst>
+            <a:ext uri="{909E8E84-426E-40DD-AFC4-6F175D3DCCD1}">
+              <a14:hiddenFill xmlns:a14="http://schemas.microsoft.com/office/drawing/2010/main">
+                <a:solidFill>
+                  <a:srgbClr val="FFFFFF"/>
+                </a:solidFill>
+              </a14:hiddenFill>
+            </a:ext>
+          </a:extLst>
+        </p:spPr>
+      </p:pic>
+      <p:sp>
+        <p:nvSpPr>
+          <p:cNvPr id="11" name="TextBox 10"/>
+          <p:cNvSpPr txBox="1"/>
+          <p:nvPr/>
+        </p:nvSpPr>
+        <p:spPr>
+          <a:xfrm>
+            <a:off x="5508104" y="3478403"/>
+            <a:ext cx="2831538" cy="276999"/>
+          </a:xfrm>
+          <a:prstGeom prst="rect">
+            <a:avLst/>
+          </a:prstGeom>
+          <a:noFill/>
+        </p:spPr>
+        <p:txBody>
+          <a:bodyPr wrap="square" rtlCol="0">
+            <a:spAutoFit/>
+          </a:bodyPr>
+          <a:lstStyle/>
+          <a:p>
+            <a:pPr algn="ctr"/>
+            <a:r>
+              <a:rPr lang="en-NZ" sz="1200" dirty="0" smtClean="0"/>
+              <a:t>Fit to epicardial data</a:t>
+            </a:r>
+            <a:endParaRPr lang="en-NZ" sz="1200" dirty="0"/>
+          </a:p>
+        </p:txBody>
+      </p:sp>
+      <p:sp>
+        <p:nvSpPr>
+          <p:cNvPr id="8" name="TextBox 7"/>
+          <p:cNvSpPr txBox="1"/>
+          <p:nvPr/>
+        </p:nvSpPr>
+        <p:spPr>
+          <a:xfrm>
+            <a:off x="395536" y="4509120"/>
+            <a:ext cx="2831538" cy="369332"/>
+          </a:xfrm>
+          <a:prstGeom prst="rect">
+            <a:avLst/>
+          </a:prstGeom>
+          <a:noFill/>
+        </p:spPr>
+        <p:txBody>
+          <a:bodyPr wrap="square" rtlCol="0">
+            <a:spAutoFit/>
+          </a:bodyPr>
+          <a:lstStyle/>
+          <a:p>
+            <a:r>
+              <a:rPr lang="en-NZ" dirty="0" smtClean="0"/>
+              <a:t>RMSE = 0.23 mm (2 </a:t>
+            </a:r>
+            <a:r>
+              <a:rPr lang="en-NZ" dirty="0" err="1" smtClean="0"/>
+              <a:t>d.p.</a:t>
+            </a:r>
+            <a:r>
+              <a:rPr lang="en-NZ" dirty="0" smtClean="0"/>
+              <a:t>)</a:t>
+            </a:r>
+            <a:endParaRPr lang="en-NZ" dirty="0"/>
+          </a:p>
+        </p:txBody>
+      </p:sp>
+      <p:sp>
+        <p:nvSpPr>
+          <p:cNvPr id="14" name="TextBox 13"/>
+          <p:cNvSpPr txBox="1"/>
+          <p:nvPr/>
+        </p:nvSpPr>
+        <p:spPr>
+          <a:xfrm>
+            <a:off x="2578795" y="6345614"/>
+            <a:ext cx="4290502" cy="307777"/>
+          </a:xfrm>
+          <a:prstGeom prst="rect">
+            <a:avLst/>
+          </a:prstGeom>
+          <a:noFill/>
+        </p:spPr>
+        <p:txBody>
+          <a:bodyPr wrap="square" rtlCol="0">
+            <a:spAutoFit/>
+          </a:bodyPr>
+          <a:lstStyle/>
+          <a:p>
+            <a:pPr algn="ctr"/>
+            <a:r>
+              <a:rPr lang="en-NZ" sz="1400" b="1" dirty="0" smtClean="0"/>
+              <a:t>Geometrically Fitted Model + fitting errors (in red)</a:t>
+            </a:r>
+            <a:endParaRPr lang="en-NZ" sz="1400" b="1" dirty="0"/>
+          </a:p>
+        </p:txBody>
+      </p:sp>
+    </p:spTree>
+    <p:extLst>
+      <p:ext uri="{BB962C8B-B14F-4D97-AF65-F5344CB8AC3E}">
+        <p14:creationId xmlns:p14="http://schemas.microsoft.com/office/powerpoint/2010/main" val="3575926905"/>
+      </p:ext>
+    </p:extLst>
+  </p:cSld>
+  <p:clrMapOvr>
+    <a:masterClrMapping/>
+  </p:clrMapOvr>
+  <p:timing>
+    <p:tnLst>
+      <p:par>
+        <p:cTn id="1" dur="indefinite" restart="never" nodeType="tmRoot"/>
+      </p:par>
+    </p:tnLst>
+  </p:timing>
+</p:sld>
+</file>
+
+<file path=ppt/slides/slide7.xml><?xml version="1.0" encoding="utf-8"?>
+<p:sld xmlns:a="http://schemas.openxmlformats.org/drawingml/2006/main" xmlns:r="http://schemas.openxmlformats.org/officeDocument/2006/relationships" xmlns:p="http://schemas.openxmlformats.org/presentationml/2006/main">
+  <p:cSld>
+    <p:spTree>
+      <p:nvGrpSpPr>
+        <p:cNvPr id="1" name=""/>
+        <p:cNvGrpSpPr/>
+        <p:nvPr/>
+      </p:nvGrpSpPr>
+      <p:grpSpPr>
+        <a:xfrm>
+          <a:off x="0" y="0"/>
+          <a:ext cx="0" cy="0"/>
+          <a:chOff x="0" y="0"/>
+          <a:chExt cx="0" cy="0"/>
+        </a:xfrm>
+      </p:grpSpPr>
+      <p:sp>
+        <p:nvSpPr>
+          <p:cNvPr id="4" name="Title 1"/>
+          <p:cNvSpPr>
+            <a:spLocks noGrp="1"/>
+          </p:cNvSpPr>
+          <p:nvPr>
+            <p:ph type="title"/>
+          </p:nvPr>
+        </p:nvSpPr>
+        <p:spPr>
+          <a:xfrm>
+            <a:off x="441194" y="231666"/>
+            <a:ext cx="8229600" cy="778098"/>
+          </a:xfrm>
+        </p:spPr>
+        <p:txBody>
+          <a:bodyPr/>
+          <a:lstStyle/>
+          <a:p>
+            <a:r>
+              <a:rPr lang="en-NZ" dirty="0" smtClean="0"/>
+              <a:t>MICCAI Challenge</a:t>
+            </a:r>
+            <a:endParaRPr lang="en-NZ" dirty="0"/>
+          </a:p>
+        </p:txBody>
+      </p:sp>
+      <p:pic>
+        <p:nvPicPr>
+          <p:cNvPr id="4098" name="Picture 2" descr="FibreData_0912.jpg"/>
+          <p:cNvPicPr>
+            <a:picLocks noChangeAspect="1" noChangeArrowheads="1"/>
+          </p:cNvPicPr>
+          <p:nvPr/>
+        </p:nvPicPr>
+        <p:blipFill>
+          <a:blip r:embed="rId2">
+            <a:extLst>
+              <a:ext uri="{28A0092B-C50C-407E-A947-70E740481C1C}">
+                <a14:useLocalDpi xmlns:a14="http://schemas.microsoft.com/office/drawing/2010/main" val="0"/>
+              </a:ext>
+            </a:extLst>
+          </a:blip>
+          <a:srcRect/>
+          <a:stretch>
+            <a:fillRect/>
+          </a:stretch>
+        </p:blipFill>
+        <p:spPr bwMode="auto">
+          <a:xfrm>
+            <a:off x="4600964" y="939241"/>
+            <a:ext cx="2779348" cy="2779349"/>
+          </a:xfrm>
+          <a:prstGeom prst="rect">
+            <a:avLst/>
+          </a:prstGeom>
+          <a:noFill/>
+          <a:extLst>
+            <a:ext uri="{909E8E84-426E-40DD-AFC4-6F175D3DCCD1}">
+              <a14:hiddenFill xmlns:a14="http://schemas.microsoft.com/office/drawing/2010/main">
+                <a:solidFill>
+                  <a:srgbClr val="FFFFFF"/>
+                </a:solidFill>
+              </a14:hiddenFill>
+            </a:ext>
+          </a:extLst>
+        </p:spPr>
+      </p:pic>
+      <p:sp>
+        <p:nvSpPr>
+          <p:cNvPr id="5" name="TextBox 4"/>
+          <p:cNvSpPr txBox="1"/>
+          <p:nvPr/>
+        </p:nvSpPr>
+        <p:spPr>
+          <a:xfrm>
+            <a:off x="2987824" y="1009764"/>
+            <a:ext cx="3168352" cy="307777"/>
+          </a:xfrm>
+          <a:prstGeom prst="rect">
+            <a:avLst/>
+          </a:prstGeom>
+          <a:noFill/>
+        </p:spPr>
+        <p:txBody>
+          <a:bodyPr wrap="square" rtlCol="0">
+            <a:spAutoFit/>
+          </a:bodyPr>
+          <a:lstStyle/>
+          <a:p>
+            <a:pPr algn="ctr"/>
+            <a:r>
+              <a:rPr lang="en-NZ" sz="1400" dirty="0" smtClean="0"/>
+              <a:t>Fibre Fitting</a:t>
+            </a:r>
+            <a:endParaRPr lang="en-NZ" sz="1400" dirty="0"/>
+          </a:p>
+        </p:txBody>
+      </p:sp>
+      <p:pic>
+        <p:nvPicPr>
+          <p:cNvPr id="4100" name="Picture 4" descr="FibreFitted_0912.jpg"/>
+          <p:cNvPicPr>
+            <a:picLocks noChangeAspect="1" noChangeArrowheads="1"/>
+          </p:cNvPicPr>
+          <p:nvPr/>
+        </p:nvPicPr>
+        <p:blipFill>
+          <a:blip r:embed="rId3">
+            <a:extLst>
+              <a:ext uri="{28A0092B-C50C-407E-A947-70E740481C1C}">
+                <a14:useLocalDpi xmlns:a14="http://schemas.microsoft.com/office/drawing/2010/main" val="0"/>
+              </a:ext>
+            </a:extLst>
+          </a:blip>
+          <a:srcRect/>
+          <a:stretch>
+            <a:fillRect/>
+          </a:stretch>
+        </p:blipFill>
+        <p:spPr bwMode="auto">
+          <a:xfrm>
+            <a:off x="4355976" y="3507884"/>
+            <a:ext cx="3300102" cy="3300103"/>
+          </a:xfrm>
+          <a:prstGeom prst="rect">
+            <a:avLst/>
+          </a:prstGeom>
+          <a:noFill/>
+          <a:extLst>
+            <a:ext uri="{909E8E84-426E-40DD-AFC4-6F175D3DCCD1}">
+              <a14:hiddenFill xmlns:a14="http://schemas.microsoft.com/office/drawing/2010/main">
+                <a:solidFill>
+                  <a:srgbClr val="FFFFFF"/>
+                </a:solidFill>
+              </a14:hiddenFill>
+            </a:ext>
+          </a:extLst>
+        </p:spPr>
+      </p:pic>
+      <p:pic>
+        <p:nvPicPr>
+          <p:cNvPr id="6" name="Picture 6" descr="FinalFitError.jpg"/>
+          <p:cNvPicPr>
+            <a:picLocks noChangeAspect="1" noChangeArrowheads="1"/>
+          </p:cNvPicPr>
+          <p:nvPr/>
+        </p:nvPicPr>
+        <p:blipFill>
+          <a:blip r:embed="rId4" cstate="print">
+            <a:extLst>
+              <a:ext uri="{28A0092B-C50C-407E-A947-70E740481C1C}">
+                <a14:useLocalDpi xmlns:a14="http://schemas.microsoft.com/office/drawing/2010/main" val="0"/>
+              </a:ext>
+            </a:extLst>
+          </a:blip>
+          <a:srcRect/>
+          <a:stretch>
+            <a:fillRect/>
+          </a:stretch>
+        </p:blipFill>
+        <p:spPr bwMode="auto">
+          <a:xfrm>
+            <a:off x="470535" y="1317541"/>
+            <a:ext cx="3269568" cy="2159024"/>
+          </a:xfrm>
+          <a:prstGeom prst="rect">
+            <a:avLst/>
+          </a:prstGeom>
+          <a:noFill/>
+          <a:extLst>
+            <a:ext uri="{909E8E84-426E-40DD-AFC4-6F175D3DCCD1}">
+              <a14:hiddenFill xmlns:a14="http://schemas.microsoft.com/office/drawing/2010/main">
+                <a:solidFill>
+                  <a:srgbClr val="FFFFFF"/>
+                </a:solidFill>
+              </a14:hiddenFill>
+            </a:ext>
+          </a:extLst>
+        </p:spPr>
+      </p:pic>
+      <p:sp>
+        <p:nvSpPr>
+          <p:cNvPr id="7" name="TextBox 6"/>
+          <p:cNvSpPr txBox="1"/>
+          <p:nvPr/>
+        </p:nvSpPr>
+        <p:spPr>
+          <a:xfrm>
+            <a:off x="689550" y="3398801"/>
+            <a:ext cx="2831538" cy="307777"/>
+          </a:xfrm>
+          <a:prstGeom prst="rect">
+            <a:avLst/>
+          </a:prstGeom>
+          <a:noFill/>
+        </p:spPr>
+        <p:txBody>
+          <a:bodyPr wrap="square" rtlCol="0">
+            <a:spAutoFit/>
+          </a:bodyPr>
+          <a:lstStyle/>
+          <a:p>
+            <a:pPr algn="ctr"/>
+            <a:r>
+              <a:rPr lang="en-NZ" sz="1400" dirty="0" smtClean="0"/>
+              <a:t>Geometrically Fitted Model</a:t>
+            </a:r>
+            <a:endParaRPr lang="en-NZ" sz="1400" dirty="0"/>
+          </a:p>
+        </p:txBody>
+      </p:sp>
+      <p:sp>
+        <p:nvSpPr>
+          <p:cNvPr id="9" name="TextBox 8"/>
+          <p:cNvSpPr txBox="1"/>
+          <p:nvPr/>
+        </p:nvSpPr>
+        <p:spPr>
+          <a:xfrm>
+            <a:off x="4355976" y="3291079"/>
+            <a:ext cx="3362135" cy="523220"/>
+          </a:xfrm>
+          <a:prstGeom prst="rect">
+            <a:avLst/>
+          </a:prstGeom>
+          <a:noFill/>
+        </p:spPr>
+        <p:txBody>
+          <a:bodyPr wrap="square" rtlCol="0">
+            <a:spAutoFit/>
+          </a:bodyPr>
+          <a:lstStyle/>
+          <a:p>
+            <a:pPr algn="ctr"/>
+            <a:r>
+              <a:rPr lang="en-NZ" sz="1400" dirty="0" smtClean="0"/>
+              <a:t>Fibre angles calculated through vector-wall projection</a:t>
+            </a:r>
+            <a:endParaRPr lang="en-NZ" sz="1400" dirty="0"/>
+          </a:p>
+        </p:txBody>
+      </p:sp>
+      <p:sp>
+        <p:nvSpPr>
+          <p:cNvPr id="11" name="TextBox 10"/>
+          <p:cNvSpPr txBox="1"/>
+          <p:nvPr/>
+        </p:nvSpPr>
+        <p:spPr>
+          <a:xfrm>
+            <a:off x="5436096" y="6342475"/>
+            <a:ext cx="3362135" cy="307777"/>
+          </a:xfrm>
+          <a:prstGeom prst="rect">
+            <a:avLst/>
+          </a:prstGeom>
+          <a:noFill/>
+        </p:spPr>
+        <p:txBody>
+          <a:bodyPr wrap="square" rtlCol="0">
+            <a:spAutoFit/>
+          </a:bodyPr>
+          <a:lstStyle/>
+          <a:p>
+            <a:pPr algn="ctr"/>
+            <a:r>
+              <a:rPr lang="en-NZ" sz="1400" b="1" dirty="0" smtClean="0"/>
+              <a:t>Fibre Fitted Model</a:t>
+            </a:r>
+            <a:endParaRPr lang="en-NZ" sz="1400" b="1" dirty="0"/>
+          </a:p>
+        </p:txBody>
+      </p:sp>
+      <mc:AlternateContent xmlns:mc="http://schemas.openxmlformats.org/markup-compatibility/2006" xmlns:a14="http://schemas.microsoft.com/office/drawing/2010/main">
+        <mc:Choice Requires="a14">
+          <p:sp>
+            <p:nvSpPr>
+              <p:cNvPr id="12" name="TextBox 11"/>
+              <p:cNvSpPr txBox="1"/>
+              <p:nvPr/>
+            </p:nvSpPr>
+            <p:spPr>
+              <a:xfrm>
+                <a:off x="395536" y="4509120"/>
+                <a:ext cx="2831538" cy="646331"/>
+              </a:xfrm>
+              <a:prstGeom prst="rect">
+                <a:avLst/>
+              </a:prstGeom>
+              <a:noFill/>
+            </p:spPr>
+            <p:txBody>
+              <a:bodyPr wrap="square" rtlCol="0">
+                <a:spAutoFit/>
+              </a:bodyPr>
+              <a:lstStyle/>
+              <a:p>
+                <a:r>
+                  <a:rPr lang="en-NZ" dirty="0" smtClean="0"/>
+                  <a:t>RMSE = 0.1789 radians</a:t>
+                </a:r>
+              </a:p>
+              <a:p>
+                <a:r>
+                  <a:rPr lang="en-NZ" dirty="0" smtClean="0"/>
+                  <a:t>= 10.25</a:t>
+                </a:r>
+                <a14:m>
+                  <m:oMath xmlns:m="http://schemas.openxmlformats.org/officeDocument/2006/math">
+                    <m:r>
+                      <a:rPr lang="en-NZ" b="0" i="1" smtClean="0">
+                        <a:latin typeface="Cambria Math"/>
+                      </a:rPr>
+                      <m:t>°</m:t>
+                    </m:r>
+                  </m:oMath>
+                </a14:m>
+                <a:r>
+                  <a:rPr lang="en-NZ" dirty="0" smtClean="0"/>
+                  <a:t> (2 </a:t>
+                </a:r>
+                <a:r>
+                  <a:rPr lang="en-NZ" dirty="0" err="1" smtClean="0"/>
+                  <a:t>d.p.</a:t>
+                </a:r>
+                <a:r>
+                  <a:rPr lang="en-NZ" dirty="0" smtClean="0"/>
+                  <a:t>)</a:t>
+                </a:r>
+                <a:endParaRPr lang="en-NZ" dirty="0"/>
+              </a:p>
+            </p:txBody>
+          </p:sp>
+        </mc:Choice>
+        <mc:Fallback xmlns="">
+          <p:sp>
+            <p:nvSpPr>
+              <p:cNvPr id="12" name="TextBox 11"/>
+              <p:cNvSpPr txBox="1">
+                <a:spLocks noRot="1" noChangeAspect="1" noMove="1" noResize="1" noEditPoints="1" noAdjustHandles="1" noChangeArrowheads="1" noChangeShapeType="1" noTextEdit="1"/>
+              </p:cNvSpPr>
+              <p:nvPr/>
+            </p:nvSpPr>
+            <p:spPr>
+              <a:xfrm>
+                <a:off x="395536" y="4509120"/>
+                <a:ext cx="2831538" cy="646331"/>
+              </a:xfrm>
+              <a:prstGeom prst="rect">
+                <a:avLst/>
+              </a:prstGeom>
+              <a:blipFill rotWithShape="1">
+                <a:blip r:embed="rId5"/>
+                <a:stretch>
+                  <a:fillRect l="-1940" t="-4717" b="-14151"/>
+                </a:stretch>
+              </a:blipFill>
+            </p:spPr>
+            <p:txBody>
+              <a:bodyPr/>
+              <a:lstStyle/>
+              <a:p>
+                <a:r>
+                  <a:rPr lang="en-NZ">
+                    <a:noFill/>
+                  </a:rPr>
+                  <a:t> </a:t>
+                </a:r>
+              </a:p>
+            </p:txBody>
+          </p:sp>
+        </mc:Fallback>
+      </mc:AlternateContent>
+    </p:spTree>
+    <p:extLst>
+      <p:ext uri="{BB962C8B-B14F-4D97-AF65-F5344CB8AC3E}">
+        <p14:creationId xmlns:p14="http://schemas.microsoft.com/office/powerpoint/2010/main" val="4021731806"/>
+      </p:ext>
+    </p:extLst>
+  </p:cSld>
+  <p:clrMapOvr>
+    <a:masterClrMapping/>
+  </p:clrMapOvr>
+  <p:timing>
+    <p:tnLst>
+      <p:par>
+        <p:cTn id="1" dur="indefinite" restart="never" nodeType="tmRoot"/>
+      </p:par>
+    </p:tnLst>
+  </p:timing>
+</p:sld>
+</file>
+
+<file path=ppt/slides/slide8.xml><?xml version="1.0" encoding="utf-8"?>
+<p:sld xmlns:a="http://schemas.openxmlformats.org/drawingml/2006/main" xmlns:r="http://schemas.openxmlformats.org/officeDocument/2006/relationships" xmlns:p="http://schemas.openxmlformats.org/presentationml/2006/main">
+  <p:cSld>
+    <p:spTree>
+      <p:nvGrpSpPr>
+        <p:cNvPr id="1" name=""/>
+        <p:cNvGrpSpPr/>
+        <p:nvPr/>
+      </p:nvGrpSpPr>
+      <p:grpSpPr>
+        <a:xfrm>
+          <a:off x="0" y="0"/>
+          <a:ext cx="0" cy="0"/>
+          <a:chOff x="0" y="0"/>
+          <a:chExt cx="0" cy="0"/>
+        </a:xfrm>
+      </p:grpSpPr>
+      <p:sp>
+        <p:nvSpPr>
+          <p:cNvPr id="2" name="Title 1"/>
+          <p:cNvSpPr>
+            <a:spLocks noGrp="1"/>
+          </p:cNvSpPr>
+          <p:nvPr>
+            <p:ph type="title"/>
+          </p:nvPr>
+        </p:nvSpPr>
+        <p:spPr/>
+        <p:txBody>
+          <a:bodyPr/>
+          <a:lstStyle/>
+          <a:p>
+            <a:r>
+              <a:rPr lang="en-NZ" dirty="0" smtClean="0"/>
+              <a:t>Benchmark Problem</a:t>
+            </a:r>
+            <a:endParaRPr lang="en-NZ" dirty="0"/>
+          </a:p>
+        </p:txBody>
+      </p:sp>
+      <p:pic>
+        <p:nvPicPr>
+          <p:cNvPr id="4" name="Picture 2" descr="C:\Users\Jenny\Desktop\TrilinearBenchmark.jpg"/>
+          <p:cNvPicPr>
+            <a:picLocks noChangeAspect="1" noChangeArrowheads="1"/>
+          </p:cNvPicPr>
+          <p:nvPr/>
+        </p:nvPicPr>
+        <p:blipFill rotWithShape="1">
+          <a:blip r:embed="rId2">
+            <a:extLst>
+              <a:ext uri="{28A0092B-C50C-407E-A947-70E740481C1C}">
+                <a14:useLocalDpi xmlns:a14="http://schemas.microsoft.com/office/drawing/2010/main" val="0"/>
+              </a:ext>
+            </a:extLst>
+          </a:blip>
+          <a:srcRect l="21296" t="25158" r="8055" b="24653"/>
+          <a:stretch/>
+        </p:blipFill>
+        <p:spPr bwMode="auto">
+          <a:xfrm>
+            <a:off x="467544" y="1124744"/>
+            <a:ext cx="8761353" cy="4110018"/>
+          </a:xfrm>
+          <a:prstGeom prst="rect">
+            <a:avLst/>
+          </a:prstGeom>
+          <a:noFill/>
+          <a:extLst>
+            <a:ext uri="{909E8E84-426E-40DD-AFC4-6F175D3DCCD1}">
+              <a14:hiddenFill xmlns:a14="http://schemas.microsoft.com/office/drawing/2010/main">
+                <a:solidFill>
+                  <a:srgbClr val="FFFFFF"/>
+                </a:solidFill>
+              </a14:hiddenFill>
+            </a:ext>
+          </a:extLst>
+        </p:spPr>
+      </p:pic>
+      <p:sp>
+        <p:nvSpPr>
+          <p:cNvPr id="6" name="Subtitle 2"/>
+          <p:cNvSpPr>
+            <a:spLocks noGrp="1"/>
+          </p:cNvSpPr>
+          <p:nvPr>
+            <p:ph idx="1"/>
+          </p:nvPr>
+        </p:nvSpPr>
+        <p:spPr>
+          <a:xfrm>
+            <a:off x="34907" y="4149080"/>
+            <a:ext cx="5194920" cy="2337123"/>
+          </a:xfrm>
+        </p:spPr>
+        <p:txBody>
+          <a:bodyPr>
+            <a:normAutofit fontScale="47500" lnSpcReduction="20000"/>
+          </a:bodyPr>
+          <a:lstStyle/>
+          <a:p>
+            <a:r>
+              <a:rPr lang="en-NZ" dirty="0" err="1">
+                <a:solidFill>
+                  <a:schemeClr val="tx1"/>
+                </a:solidFill>
+              </a:rPr>
+              <a:t>Dirichlet</a:t>
+            </a:r>
+            <a:r>
+              <a:rPr lang="en-NZ" dirty="0">
+                <a:solidFill>
+                  <a:schemeClr val="tx1"/>
+                </a:solidFill>
+              </a:rPr>
+              <a:t> boundary conditions: the left face (x=0) is fixed</a:t>
+            </a:r>
+            <a:r>
+              <a:rPr lang="en-NZ" dirty="0" smtClean="0">
+                <a:solidFill>
+                  <a:schemeClr val="tx1"/>
+                </a:solidFill>
+              </a:rPr>
+              <a:t>.</a:t>
+            </a:r>
+          </a:p>
+          <a:p>
+            <a:r>
+              <a:rPr lang="en-NZ" dirty="0">
+                <a:solidFill>
+                  <a:schemeClr val="tx1"/>
+                </a:solidFill>
+              </a:rPr>
+              <a:t>Pressure boundary condition: </a:t>
+            </a:r>
+            <a:r>
+              <a:rPr lang="en-NZ" b="1" dirty="0">
+                <a:solidFill>
+                  <a:schemeClr val="tx1"/>
+                </a:solidFill>
+              </a:rPr>
+              <a:t>0.004 kPa </a:t>
+            </a:r>
+            <a:r>
+              <a:rPr lang="en-NZ" dirty="0">
+                <a:solidFill>
+                  <a:schemeClr val="tx1"/>
+                </a:solidFill>
+              </a:rPr>
+              <a:t>pressure is applied to the bottom (z=0) face</a:t>
+            </a:r>
+            <a:r>
+              <a:rPr lang="en-NZ" dirty="0" smtClean="0">
+                <a:solidFill>
+                  <a:schemeClr val="tx1"/>
+                </a:solidFill>
+              </a:rPr>
+              <a:t>. Please </a:t>
+            </a:r>
+            <a:r>
+              <a:rPr lang="en-NZ" dirty="0">
+                <a:solidFill>
+                  <a:schemeClr val="tx1"/>
+                </a:solidFill>
+              </a:rPr>
+              <a:t>note that the direction of the pressure boundary condition scales with the deformed normal, and its magnitude with deformed area</a:t>
+            </a:r>
+            <a:r>
+              <a:rPr lang="en-NZ" dirty="0" smtClean="0">
+                <a:solidFill>
+                  <a:schemeClr val="tx1"/>
+                </a:solidFill>
+              </a:rPr>
+              <a:t>.</a:t>
+            </a:r>
+          </a:p>
+          <a:p>
+            <a:r>
+              <a:rPr lang="en-NZ" dirty="0" smtClean="0">
+                <a:solidFill>
+                  <a:schemeClr val="tx1"/>
+                </a:solidFill>
+              </a:rPr>
+              <a:t>Using Guccione’s transversely isotropic constitutive law</a:t>
+            </a:r>
+          </a:p>
+          <a:p>
+            <a:r>
+              <a:rPr lang="en-NZ" dirty="0">
+                <a:solidFill>
+                  <a:schemeClr val="tx1"/>
+                </a:solidFill>
+              </a:rPr>
+              <a:t>W = C/2 (</a:t>
+            </a:r>
+            <a:r>
+              <a:rPr lang="en-NZ" dirty="0" err="1">
+                <a:solidFill>
+                  <a:schemeClr val="tx1"/>
+                </a:solidFill>
+              </a:rPr>
+              <a:t>e^Q</a:t>
+            </a:r>
+            <a:r>
+              <a:rPr lang="en-NZ" dirty="0">
+                <a:solidFill>
+                  <a:schemeClr val="tx1"/>
+                </a:solidFill>
+              </a:rPr>
+              <a:t> - 1</a:t>
+            </a:r>
+            <a:r>
+              <a:rPr lang="en-NZ" dirty="0" smtClean="0">
+                <a:solidFill>
+                  <a:schemeClr val="tx1"/>
+                </a:solidFill>
+              </a:rPr>
+              <a:t>)</a:t>
+            </a:r>
+          </a:p>
+          <a:p>
+            <a:r>
+              <a:rPr lang="en-NZ" dirty="0" smtClean="0">
+                <a:solidFill>
+                  <a:schemeClr val="tx1"/>
+                </a:solidFill>
+              </a:rPr>
+              <a:t>Q </a:t>
+            </a:r>
+            <a:r>
+              <a:rPr lang="en-NZ" dirty="0">
+                <a:solidFill>
+                  <a:schemeClr val="tx1"/>
+                </a:solidFill>
+              </a:rPr>
+              <a:t>= </a:t>
+            </a:r>
+            <a:r>
+              <a:rPr lang="en-NZ" dirty="0" err="1">
+                <a:solidFill>
+                  <a:schemeClr val="tx1"/>
+                </a:solidFill>
+              </a:rPr>
+              <a:t>b_f</a:t>
+            </a:r>
+            <a:r>
+              <a:rPr lang="en-NZ" dirty="0">
+                <a:solidFill>
+                  <a:schemeClr val="tx1"/>
+                </a:solidFill>
+              </a:rPr>
+              <a:t> E11^2 + </a:t>
+            </a:r>
+            <a:r>
+              <a:rPr lang="en-NZ" dirty="0" err="1">
+                <a:solidFill>
+                  <a:schemeClr val="tx1"/>
+                </a:solidFill>
+              </a:rPr>
+              <a:t>b_t</a:t>
+            </a:r>
+            <a:r>
+              <a:rPr lang="en-NZ" dirty="0">
+                <a:solidFill>
+                  <a:schemeClr val="tx1"/>
+                </a:solidFill>
+              </a:rPr>
+              <a:t> (E_22^2 + E33^3 + E23^2+ E32^2) + </a:t>
+            </a:r>
+            <a:r>
+              <a:rPr lang="en-NZ" dirty="0" err="1">
+                <a:solidFill>
+                  <a:schemeClr val="tx1"/>
+                </a:solidFill>
+              </a:rPr>
+              <a:t>b_fs</a:t>
+            </a:r>
+            <a:r>
+              <a:rPr lang="en-NZ" dirty="0">
+                <a:solidFill>
+                  <a:schemeClr val="tx1"/>
+                </a:solidFill>
+              </a:rPr>
+              <a:t> (E_12^2 + E_21^2</a:t>
+            </a:r>
+            <a:endParaRPr lang="en-NZ" dirty="0" smtClean="0">
+              <a:solidFill>
+                <a:schemeClr val="tx1"/>
+              </a:solidFill>
+            </a:endParaRPr>
+          </a:p>
+          <a:p>
+            <a:r>
+              <a:rPr lang="en-NZ" dirty="0" smtClean="0">
+                <a:solidFill>
+                  <a:schemeClr val="tx1"/>
+                </a:solidFill>
+              </a:rPr>
+              <a:t> where </a:t>
+            </a:r>
+            <a:r>
+              <a:rPr lang="en-NZ" b="1" dirty="0" smtClean="0">
+                <a:solidFill>
+                  <a:schemeClr val="tx1"/>
+                </a:solidFill>
+              </a:rPr>
+              <a:t>C    </a:t>
+            </a:r>
+            <a:r>
+              <a:rPr lang="en-NZ" b="1" dirty="0">
+                <a:solidFill>
+                  <a:schemeClr val="tx1"/>
+                </a:solidFill>
+              </a:rPr>
+              <a:t>= 0.876 </a:t>
+            </a:r>
+            <a:r>
+              <a:rPr lang="en-NZ" b="1" dirty="0" smtClean="0">
+                <a:solidFill>
+                  <a:schemeClr val="tx1"/>
+                </a:solidFill>
+              </a:rPr>
+              <a:t>kPa, </a:t>
+            </a:r>
+            <a:r>
+              <a:rPr lang="en-NZ" b="1" dirty="0" err="1" smtClean="0">
+                <a:solidFill>
+                  <a:schemeClr val="tx1"/>
+                </a:solidFill>
+              </a:rPr>
+              <a:t>b_f</a:t>
+            </a:r>
+            <a:r>
+              <a:rPr lang="en-NZ" b="1" dirty="0" smtClean="0">
+                <a:solidFill>
+                  <a:schemeClr val="tx1"/>
+                </a:solidFill>
+              </a:rPr>
+              <a:t>  </a:t>
+            </a:r>
+            <a:r>
+              <a:rPr lang="en-NZ" b="1" dirty="0">
+                <a:solidFill>
+                  <a:schemeClr val="tx1"/>
+                </a:solidFill>
+              </a:rPr>
+              <a:t>= </a:t>
+            </a:r>
+            <a:r>
+              <a:rPr lang="en-NZ" b="1" dirty="0" smtClean="0">
+                <a:solidFill>
+                  <a:schemeClr val="tx1"/>
+                </a:solidFill>
+              </a:rPr>
+              <a:t>18.48, </a:t>
+            </a:r>
+            <a:r>
+              <a:rPr lang="en-NZ" b="1" dirty="0" err="1" smtClean="0">
+                <a:solidFill>
+                  <a:schemeClr val="tx1"/>
+                </a:solidFill>
+              </a:rPr>
+              <a:t>b_t</a:t>
+            </a:r>
+            <a:r>
+              <a:rPr lang="en-NZ" b="1" dirty="0" smtClean="0">
+                <a:solidFill>
+                  <a:schemeClr val="tx1"/>
+                </a:solidFill>
+              </a:rPr>
+              <a:t>  </a:t>
+            </a:r>
+            <a:r>
+              <a:rPr lang="en-NZ" b="1" dirty="0">
+                <a:solidFill>
+                  <a:schemeClr val="tx1"/>
+                </a:solidFill>
+              </a:rPr>
+              <a:t>= </a:t>
+            </a:r>
+            <a:r>
+              <a:rPr lang="en-NZ" b="1" dirty="0" smtClean="0">
+                <a:solidFill>
+                  <a:schemeClr val="tx1"/>
+                </a:solidFill>
+              </a:rPr>
+              <a:t>3.58, </a:t>
+            </a:r>
+            <a:r>
+              <a:rPr lang="en-NZ" b="1" dirty="0" err="1" smtClean="0">
+                <a:solidFill>
+                  <a:schemeClr val="tx1"/>
+                </a:solidFill>
+              </a:rPr>
+              <a:t>b_fs</a:t>
+            </a:r>
+            <a:r>
+              <a:rPr lang="en-NZ" b="1" dirty="0" smtClean="0">
+                <a:solidFill>
+                  <a:schemeClr val="tx1"/>
+                </a:solidFill>
+              </a:rPr>
+              <a:t> </a:t>
+            </a:r>
+            <a:r>
+              <a:rPr lang="en-NZ" b="1" dirty="0">
+                <a:solidFill>
+                  <a:schemeClr val="tx1"/>
+                </a:solidFill>
+              </a:rPr>
+              <a:t>= </a:t>
+            </a:r>
+            <a:r>
+              <a:rPr lang="en-NZ" b="1" dirty="0" smtClean="0">
+                <a:solidFill>
+                  <a:schemeClr val="tx1"/>
+                </a:solidFill>
+              </a:rPr>
+              <a:t>1.627</a:t>
+            </a:r>
+          </a:p>
+        </p:txBody>
+      </p:sp>
+    </p:spTree>
+    <p:extLst>
+      <p:ext uri="{BB962C8B-B14F-4D97-AF65-F5344CB8AC3E}">
+        <p14:creationId xmlns:p14="http://schemas.microsoft.com/office/powerpoint/2010/main" val="3878219090"/>
+      </p:ext>
+    </p:extLst>
+  </p:cSld>
+  <p:clrMapOvr>
+    <a:masterClrMapping/>
+  </p:clrMapOvr>
+  <p:timing>
+    <p:tnLst>
+      <p:par>
+        <p:cTn id="1" dur="indefinite" restart="never" nodeType="tmRoot"/>
+      </p:par>
+    </p:tnLst>
+  </p:timing>
+</p:sld>
+</file>
+
+<file path=ppt/slides/slide9.xml><?xml version="1.0" encoding="utf-8"?>
+<p:sld xmlns:a="http://schemas.openxmlformats.org/drawingml/2006/main" xmlns:r="http://schemas.openxmlformats.org/officeDocument/2006/relationships" xmlns:p="http://schemas.openxmlformats.org/presentationml/2006/main">
+  <p:cSld>
+    <p:spTree>
+      <p:nvGrpSpPr>
+        <p:cNvPr id="1" name=""/>
+        <p:cNvGrpSpPr/>
+        <p:nvPr/>
+      </p:nvGrpSpPr>
+      <p:grpSpPr>
+        <a:xfrm>
+          <a:off x="0" y="0"/>
+          <a:ext cx="0" cy="0"/>
+          <a:chOff x="0" y="0"/>
+          <a:chExt cx="0" cy="0"/>
+        </a:xfrm>
+      </p:grpSpPr>
+      <p:sp>
+        <p:nvSpPr>
+          <p:cNvPr id="2" name="Title 1"/>
+          <p:cNvSpPr>
+            <a:spLocks noGrp="1"/>
+          </p:cNvSpPr>
+          <p:nvPr>
+            <p:ph type="title"/>
+          </p:nvPr>
+        </p:nvSpPr>
+        <p:spPr/>
+        <p:txBody>
+          <a:bodyPr/>
+          <a:lstStyle/>
+          <a:p>
+            <a:r>
+              <a:rPr lang="en-NZ" dirty="0" smtClean="0"/>
+              <a:t>OpenCMISS CellML</a:t>
+            </a:r>
+            <a:endParaRPr lang="en-NZ" dirty="0"/>
+          </a:p>
+        </p:txBody>
+      </p:sp>
+      <p:sp>
+        <p:nvSpPr>
+          <p:cNvPr id="3" name="Content Placeholder 2"/>
+          <p:cNvSpPr>
+            <a:spLocks noGrp="1"/>
+          </p:cNvSpPr>
+          <p:nvPr>
+            <p:ph idx="1"/>
+          </p:nvPr>
+        </p:nvSpPr>
+        <p:spPr/>
+        <p:txBody>
+          <a:bodyPr/>
+          <a:lstStyle/>
+          <a:p>
+            <a:r>
+              <a:rPr lang="en-NZ" dirty="0" smtClean="0"/>
+              <a:t>OpenCMISS specifies that there must be 2 components for the material field when the constitutive law is defined in CellML. </a:t>
+            </a:r>
+          </a:p>
+          <a:p>
+            <a:r>
+              <a:rPr lang="en-NZ" dirty="0" smtClean="0"/>
+              <a:t>A fix was made by modifying the source code. </a:t>
+            </a:r>
+          </a:p>
+          <a:p>
+            <a:r>
+              <a:rPr lang="en-NZ" dirty="0" smtClean="0"/>
+              <a:t>However, due to a unknown problem, the modified code is not being executed. Memory leakage problems are suspected. </a:t>
+            </a:r>
+          </a:p>
+          <a:p>
+            <a:pPr marL="0" indent="0">
+              <a:buNone/>
+            </a:pPr>
+            <a:endParaRPr lang="en-NZ" dirty="0" smtClean="0"/>
+          </a:p>
+        </p:txBody>
+      </p:sp>
+    </p:spTree>
+    <p:extLst>
+      <p:ext uri="{BB962C8B-B14F-4D97-AF65-F5344CB8AC3E}">
+        <p14:creationId xmlns:p14="http://schemas.microsoft.com/office/powerpoint/2010/main" val="823584172"/>
       </p:ext>
     </p:extLst>
   </p:cSld>

</xml_diff>